<commit_message>
Fix legend, update presentation
</commit_message>
<xml_diff>
--- a/Injuries_CR_2022.pptx
+++ b/Injuries_CR_2022.pptx
@@ -7023,7 +7023,7 @@
       </p:grpSpPr>
       <p:sp>
         <p:nvSpPr>
-          <p:cNvPr id="44" name="Rectangle 43">
+          <p:cNvPr id="61" name="Rectangle 60">
             <a:extLst>
               <a:ext uri="{FF2B5EF4-FFF2-40B4-BE49-F238E27FC236}">
                 <a16:creationId xmlns:a16="http://schemas.microsoft.com/office/drawing/2014/main" id="{AA6EC888-B85F-410F-B430-06583E94BEEC}"/>
@@ -7085,7 +7085,7 @@
       </p:sp>
       <p:sp>
         <p:nvSpPr>
-          <p:cNvPr id="46" name="Rectangle 45">
+          <p:cNvPr id="63" name="Rectangle 62">
             <a:extLst>
               <a:ext uri="{FF2B5EF4-FFF2-40B4-BE49-F238E27FC236}">
                 <a16:creationId xmlns:a16="http://schemas.microsoft.com/office/drawing/2014/main" id="{9485DA84-CB73-4E5E-9864-2460CE28055D}"/>
@@ -7148,7 +7148,7 @@
       </p:sp>
       <p:sp>
         <p:nvSpPr>
-          <p:cNvPr id="48" name="Rectangle 47">
+          <p:cNvPr id="65" name="Rectangle 64">
             <a:extLst>
               <a:ext uri="{FF2B5EF4-FFF2-40B4-BE49-F238E27FC236}">
                 <a16:creationId xmlns:a16="http://schemas.microsoft.com/office/drawing/2014/main" id="{7D49185E-361A-421B-8F2D-11C7FFC686F0}"/>
@@ -7211,7 +7211,7 @@
       </p:sp>
       <p:sp>
         <p:nvSpPr>
-          <p:cNvPr id="50" name="Rectangle 49">
+          <p:cNvPr id="67" name="Rectangle 66">
             <a:extLst>
               <a:ext uri="{FF2B5EF4-FFF2-40B4-BE49-F238E27FC236}">
                 <a16:creationId xmlns:a16="http://schemas.microsoft.com/office/drawing/2014/main" id="{14B85BAA-C37F-44B4-B427-B4F10EBB4183}"/>
@@ -7274,7 +7274,7 @@
       </p:sp>
       <p:sp>
         <p:nvSpPr>
-          <p:cNvPr id="52" name="Rectangle 51">
+          <p:cNvPr id="69" name="Rectangle 68">
             <a:extLst>
               <a:ext uri="{FF2B5EF4-FFF2-40B4-BE49-F238E27FC236}">
                 <a16:creationId xmlns:a16="http://schemas.microsoft.com/office/drawing/2014/main" id="{EDC4EE06-D7B4-4FAC-A561-38A1C380232A}"/>
@@ -7337,7 +7337,7 @@
       </p:sp>
       <p:sp>
         <p:nvSpPr>
-          <p:cNvPr id="54" name="Rectangle 53">
+          <p:cNvPr id="71" name="Rectangle 70">
             <a:extLst>
               <a:ext uri="{FF2B5EF4-FFF2-40B4-BE49-F238E27FC236}">
                 <a16:creationId xmlns:a16="http://schemas.microsoft.com/office/drawing/2014/main" id="{9018D83B-903C-4782-B1BB-A45164A71F60}"/>
@@ -7400,7 +7400,7 @@
       </p:sp>
       <p:sp>
         <p:nvSpPr>
-          <p:cNvPr id="56" name="Rectangle 55">
+          <p:cNvPr id="73" name="Rectangle 72">
             <a:extLst>
               <a:ext uri="{FF2B5EF4-FFF2-40B4-BE49-F238E27FC236}">
                 <a16:creationId xmlns:a16="http://schemas.microsoft.com/office/drawing/2014/main" id="{8785589A-A5AC-409A-B2A2-24D871B4CEF0}"/>
@@ -7463,10 +7463,10 @@
       </p:sp>
       <p:pic>
         <p:nvPicPr>
-          <p:cNvPr id="8" name="Zástupný obsah 7">
+          <p:cNvPr id="5" name="Zástupný obsah 4">
             <a:extLst>
               <a:ext uri="{FF2B5EF4-FFF2-40B4-BE49-F238E27FC236}">
-                <a16:creationId xmlns:a16="http://schemas.microsoft.com/office/drawing/2014/main" id="{F3DF7232-A9BE-7E94-BCE9-5737A30533F9}"/>
+                <a16:creationId xmlns:a16="http://schemas.microsoft.com/office/drawing/2014/main" id="{A82C6DF6-3595-9292-E011-1A5035CD14DB}"/>
               </a:ext>
             </a:extLst>
           </p:cNvPr>
@@ -11583,7 +11583,7 @@
       </p:grpSpPr>
       <p:sp>
         <p:nvSpPr>
-          <p:cNvPr id="61" name="Rectangle 60">
+          <p:cNvPr id="78" name="Rectangle 77">
             <a:extLst>
               <a:ext uri="{FF2B5EF4-FFF2-40B4-BE49-F238E27FC236}">
                 <a16:creationId xmlns:a16="http://schemas.microsoft.com/office/drawing/2014/main" id="{AA6EC888-B85F-410F-B430-06583E94BEEC}"/>
@@ -11645,7 +11645,7 @@
       </p:sp>
       <p:sp>
         <p:nvSpPr>
-          <p:cNvPr id="63" name="Rectangle 62">
+          <p:cNvPr id="80" name="Rectangle 79">
             <a:extLst>
               <a:ext uri="{FF2B5EF4-FFF2-40B4-BE49-F238E27FC236}">
                 <a16:creationId xmlns:a16="http://schemas.microsoft.com/office/drawing/2014/main" id="{9485DA84-CB73-4E5E-9864-2460CE28055D}"/>
@@ -11708,7 +11708,7 @@
       </p:sp>
       <p:sp>
         <p:nvSpPr>
-          <p:cNvPr id="65" name="Rectangle 64">
+          <p:cNvPr id="82" name="Rectangle 81">
             <a:extLst>
               <a:ext uri="{FF2B5EF4-FFF2-40B4-BE49-F238E27FC236}">
                 <a16:creationId xmlns:a16="http://schemas.microsoft.com/office/drawing/2014/main" id="{7D49185E-361A-421B-8F2D-11C7FFC686F0}"/>
@@ -11771,7 +11771,7 @@
       </p:sp>
       <p:sp>
         <p:nvSpPr>
-          <p:cNvPr id="67" name="Rectangle 66">
+          <p:cNvPr id="84" name="Rectangle 83">
             <a:extLst>
               <a:ext uri="{FF2B5EF4-FFF2-40B4-BE49-F238E27FC236}">
                 <a16:creationId xmlns:a16="http://schemas.microsoft.com/office/drawing/2014/main" id="{14B85BAA-C37F-44B4-B427-B4F10EBB4183}"/>
@@ -11834,7 +11834,7 @@
       </p:sp>
       <p:sp>
         <p:nvSpPr>
-          <p:cNvPr id="69" name="Rectangle 68">
+          <p:cNvPr id="86" name="Rectangle 85">
             <a:extLst>
               <a:ext uri="{FF2B5EF4-FFF2-40B4-BE49-F238E27FC236}">
                 <a16:creationId xmlns:a16="http://schemas.microsoft.com/office/drawing/2014/main" id="{EDC4EE06-D7B4-4FAC-A561-38A1C380232A}"/>
@@ -11897,7 +11897,7 @@
       </p:sp>
       <p:sp>
         <p:nvSpPr>
-          <p:cNvPr id="71" name="Rectangle 70">
+          <p:cNvPr id="88" name="Rectangle 87">
             <a:extLst>
               <a:ext uri="{FF2B5EF4-FFF2-40B4-BE49-F238E27FC236}">
                 <a16:creationId xmlns:a16="http://schemas.microsoft.com/office/drawing/2014/main" id="{9018D83B-903C-4782-B1BB-A45164A71F60}"/>
@@ -11960,7 +11960,7 @@
       </p:sp>
       <p:sp>
         <p:nvSpPr>
-          <p:cNvPr id="73" name="Rectangle 72">
+          <p:cNvPr id="90" name="Rectangle 89">
             <a:extLst>
               <a:ext uri="{FF2B5EF4-FFF2-40B4-BE49-F238E27FC236}">
                 <a16:creationId xmlns:a16="http://schemas.microsoft.com/office/drawing/2014/main" id="{8785589A-A5AC-409A-B2A2-24D871B4CEF0}"/>
@@ -12023,10 +12023,10 @@
       </p:sp>
       <p:pic>
         <p:nvPicPr>
-          <p:cNvPr id="15" name="Zástupný obsah 14">
+          <p:cNvPr id="5" name="Zástupný obsah 4">
             <a:extLst>
               <a:ext uri="{FF2B5EF4-FFF2-40B4-BE49-F238E27FC236}">
-                <a16:creationId xmlns:a16="http://schemas.microsoft.com/office/drawing/2014/main" id="{5455061A-DCA6-9680-29A3-0FEA2A03C615}"/>
+                <a16:creationId xmlns:a16="http://schemas.microsoft.com/office/drawing/2014/main" id="{CA741D71-94D2-EC82-F154-307BCF5AC2D1}"/>
               </a:ext>
             </a:extLst>
           </p:cNvPr>
@@ -12051,8 +12051,8 @@
         </p:blipFill>
         <p:spPr>
           <a:xfrm>
-            <a:off x="482600" y="546235"/>
-            <a:ext cx="11226799" cy="5760861"/>
+            <a:off x="626013" y="480515"/>
+            <a:ext cx="10939973" cy="5892302"/>
           </a:xfrm>
           <a:prstGeom prst="rect">
             <a:avLst/>

</xml_diff>